<commit_message>
Update example in Main Menu and Profile Menu
</commit_message>
<xml_diff>
--- a/docs/pictures/screenshots-labelling-template.pptx
+++ b/docs/pictures/screenshots-labelling-template.pptx
@@ -7,6 +7,8 @@
   <p:sldIdLst>
     <p:sldId id="256" r:id="rId2"/>
     <p:sldId id="259" r:id="rId3"/>
+    <p:sldId id="260" r:id="rId4"/>
+    <p:sldId id="261" r:id="rId5"/>
   </p:sldIdLst>
   <p:sldSz cx="12192000" cy="6858000"/>
   <p:notesSz cx="6858000" cy="9144000"/>
@@ -105,11 +107,149 @@
       </a:defRPr>
     </a:lvl9pPr>
   </p:defaultTextStyle>
+  <p:extLst>
+    <p:ext uri="{EFAFB233-063F-42B5-8137-9DF3F51BA10A}">
+      <p15:sldGuideLst xmlns:p15="http://schemas.microsoft.com/office/powerpoint/2012/main"/>
+    </p:ext>
+  </p:extLst>
 </p:presentation>
 </file>
 
 <file path=ppt/changesInfos/changesInfo1.xml><?xml version="1.0" encoding="utf-8"?>
 <pc:chgInfo xmlns:a="http://schemas.openxmlformats.org/drawingml/2006/main" xmlns:r="http://schemas.openxmlformats.org/officeDocument/2006/relationships" xmlns:ac="http://schemas.microsoft.com/office/drawing/2013/main/command" xmlns:pc="http://schemas.microsoft.com/office/powerpoint/2013/main/command">
+  <pc:docChgLst>
+    <pc:chgData name="Khoa" userId="7c7bd88e-db2d-46c9-9acd-efbe43ea0329" providerId="ADAL" clId="{ABD0BB49-6322-4496-8D0D-FD49B3F95C27}"/>
+    <pc:docChg chg="undo custSel addSld delSld modSld">
+      <pc:chgData name="Khoa" userId="7c7bd88e-db2d-46c9-9acd-efbe43ea0329" providerId="ADAL" clId="{ABD0BB49-6322-4496-8D0D-FD49B3F95C27}" dt="2020-11-09T02:46:29.875" v="295" actId="14100"/>
+      <pc:docMkLst>
+        <pc:docMk/>
+      </pc:docMkLst>
+      <pc:sldChg chg="addSp delSp modSp add mod">
+        <pc:chgData name="Khoa" userId="7c7bd88e-db2d-46c9-9acd-efbe43ea0329" providerId="ADAL" clId="{ABD0BB49-6322-4496-8D0D-FD49B3F95C27}" dt="2020-11-09T02:39:37.055" v="235" actId="1038"/>
+        <pc:sldMkLst>
+          <pc:docMk/>
+          <pc:sldMk cId="108612160" sldId="260"/>
+        </pc:sldMkLst>
+        <pc:spChg chg="mod ord">
+          <ac:chgData name="Khoa" userId="7c7bd88e-db2d-46c9-9acd-efbe43ea0329" providerId="ADAL" clId="{ABD0BB49-6322-4496-8D0D-FD49B3F95C27}" dt="2020-11-09T02:39:14.596" v="223" actId="14100"/>
+          <ac:spMkLst>
+            <pc:docMk/>
+            <pc:sldMk cId="108612160" sldId="260"/>
+            <ac:spMk id="9" creationId="{3FE3CF31-D108-489E-861C-F6EF732C5F94}"/>
+          </ac:spMkLst>
+        </pc:spChg>
+        <pc:spChg chg="mod ord">
+          <ac:chgData name="Khoa" userId="7c7bd88e-db2d-46c9-9acd-efbe43ea0329" providerId="ADAL" clId="{ABD0BB49-6322-4496-8D0D-FD49B3F95C27}" dt="2020-11-09T02:39:37.055" v="235" actId="1038"/>
+          <ac:spMkLst>
+            <pc:docMk/>
+            <pc:sldMk cId="108612160" sldId="260"/>
+            <ac:spMk id="10" creationId="{09B9DE19-C65F-427B-8A54-95F3E5D893F2}"/>
+          </ac:spMkLst>
+        </pc:spChg>
+        <pc:spChg chg="add del">
+          <ac:chgData name="Khoa" userId="7c7bd88e-db2d-46c9-9acd-efbe43ea0329" providerId="ADAL" clId="{ABD0BB49-6322-4496-8D0D-FD49B3F95C27}" dt="2020-11-09T02:38:06.464" v="187"/>
+          <ac:spMkLst>
+            <pc:docMk/>
+            <pc:sldMk cId="108612160" sldId="260"/>
+            <ac:spMk id="18" creationId="{50EF5C3E-D031-473F-B261-AA06AAEB3C11}"/>
+          </ac:spMkLst>
+        </pc:spChg>
+        <pc:picChg chg="add del mod modCrop">
+          <ac:chgData name="Khoa" userId="7c7bd88e-db2d-46c9-9acd-efbe43ea0329" providerId="ADAL" clId="{ABD0BB49-6322-4496-8D0D-FD49B3F95C27}" dt="2020-11-09T02:35:41.252" v="130" actId="478"/>
+          <ac:picMkLst>
+            <pc:docMk/>
+            <pc:sldMk cId="108612160" sldId="260"/>
+            <ac:picMk id="3" creationId="{BF15968C-E565-4315-AB16-07B36695EAFB}"/>
+          </ac:picMkLst>
+        </pc:picChg>
+        <pc:picChg chg="del">
+          <ac:chgData name="Khoa" userId="7c7bd88e-db2d-46c9-9acd-efbe43ea0329" providerId="ADAL" clId="{ABD0BB49-6322-4496-8D0D-FD49B3F95C27}" dt="2020-11-09T02:28:32.571" v="3" actId="478"/>
+          <ac:picMkLst>
+            <pc:docMk/>
+            <pc:sldMk cId="108612160" sldId="260"/>
+            <ac:picMk id="7" creationId="{8C6D3B4D-CBC1-48F1-B147-3D4584894F16}"/>
+          </ac:picMkLst>
+        </pc:picChg>
+        <pc:picChg chg="add mod">
+          <ac:chgData name="Khoa" userId="7c7bd88e-db2d-46c9-9acd-efbe43ea0329" providerId="ADAL" clId="{ABD0BB49-6322-4496-8D0D-FD49B3F95C27}" dt="2020-11-09T02:39:09.562" v="221" actId="1076"/>
+          <ac:picMkLst>
+            <pc:docMk/>
+            <pc:sldMk cId="108612160" sldId="260"/>
+            <ac:picMk id="13" creationId="{FA2CB288-A1E5-4CEC-98C3-397333E359A0}"/>
+          </ac:picMkLst>
+        </pc:picChg>
+        <pc:cxnChg chg="mod ord">
+          <ac:chgData name="Khoa" userId="7c7bd88e-db2d-46c9-9acd-efbe43ea0329" providerId="ADAL" clId="{ABD0BB49-6322-4496-8D0D-FD49B3F95C27}" dt="2020-11-09T02:39:37.055" v="235" actId="1038"/>
+          <ac:cxnSpMkLst>
+            <pc:docMk/>
+            <pc:sldMk cId="108612160" sldId="260"/>
+            <ac:cxnSpMk id="12" creationId="{D86309D3-EB9B-4415-9117-874D2DFB9A59}"/>
+          </ac:cxnSpMkLst>
+        </pc:cxnChg>
+      </pc:sldChg>
+      <pc:sldChg chg="add del">
+        <pc:chgData name="Khoa" userId="7c7bd88e-db2d-46c9-9acd-efbe43ea0329" providerId="ADAL" clId="{ABD0BB49-6322-4496-8D0D-FD49B3F95C27}" dt="2020-11-09T02:27:03.649" v="1" actId="2890"/>
+        <pc:sldMkLst>
+          <pc:docMk/>
+          <pc:sldMk cId="2045462964" sldId="260"/>
+        </pc:sldMkLst>
+      </pc:sldChg>
+      <pc:sldChg chg="add del replId">
+        <pc:chgData name="Khoa" userId="7c7bd88e-db2d-46c9-9acd-efbe43ea0329" providerId="ADAL" clId="{ABD0BB49-6322-4496-8D0D-FD49B3F95C27}" dt="2020-11-09T02:27:03.649" v="1" actId="2890"/>
+        <pc:sldMkLst>
+          <pc:docMk/>
+          <pc:sldMk cId="1536008564" sldId="261"/>
+        </pc:sldMkLst>
+      </pc:sldChg>
+      <pc:sldChg chg="addSp delSp modSp add mod replId">
+        <pc:chgData name="Khoa" userId="7c7bd88e-db2d-46c9-9acd-efbe43ea0329" providerId="ADAL" clId="{ABD0BB49-6322-4496-8D0D-FD49B3F95C27}" dt="2020-11-09T02:46:29.875" v="295" actId="14100"/>
+        <pc:sldMkLst>
+          <pc:docMk/>
+          <pc:sldMk cId="3964914803" sldId="261"/>
+        </pc:sldMkLst>
+        <pc:spChg chg="mod ord">
+          <ac:chgData name="Khoa" userId="7c7bd88e-db2d-46c9-9acd-efbe43ea0329" providerId="ADAL" clId="{ABD0BB49-6322-4496-8D0D-FD49B3F95C27}" dt="2020-11-09T02:46:00.011" v="256" actId="14100"/>
+          <ac:spMkLst>
+            <pc:docMk/>
+            <pc:sldMk cId="3964914803" sldId="261"/>
+            <ac:spMk id="9" creationId="{3FE3CF31-D108-489E-861C-F6EF732C5F94}"/>
+          </ac:spMkLst>
+        </pc:spChg>
+        <pc:spChg chg="mod ord">
+          <ac:chgData name="Khoa" userId="7c7bd88e-db2d-46c9-9acd-efbe43ea0329" providerId="ADAL" clId="{ABD0BB49-6322-4496-8D0D-FD49B3F95C27}" dt="2020-11-09T02:46:29.875" v="295" actId="14100"/>
+          <ac:spMkLst>
+            <pc:docMk/>
+            <pc:sldMk cId="3964914803" sldId="261"/>
+            <ac:spMk id="10" creationId="{09B9DE19-C65F-427B-8A54-95F3E5D893F2}"/>
+          </ac:spMkLst>
+        </pc:spChg>
+        <pc:picChg chg="del">
+          <ac:chgData name="Khoa" userId="7c7bd88e-db2d-46c9-9acd-efbe43ea0329" providerId="ADAL" clId="{ABD0BB49-6322-4496-8D0D-FD49B3F95C27}" dt="2020-11-09T02:44:46.557" v="236" actId="478"/>
+          <ac:picMkLst>
+            <pc:docMk/>
+            <pc:sldMk cId="3964914803" sldId="261"/>
+            <ac:picMk id="3" creationId="{AB36DAD0-40B4-4AFC-91CE-F8818B506F01}"/>
+          </ac:picMkLst>
+        </pc:picChg>
+        <pc:picChg chg="add mod modCrop">
+          <ac:chgData name="Khoa" userId="7c7bd88e-db2d-46c9-9acd-efbe43ea0329" providerId="ADAL" clId="{ABD0BB49-6322-4496-8D0D-FD49B3F95C27}" dt="2020-11-09T02:45:33.840" v="249" actId="732"/>
+          <ac:picMkLst>
+            <pc:docMk/>
+            <pc:sldMk cId="3964914803" sldId="261"/>
+            <ac:picMk id="4" creationId="{EB3D3206-8BF9-470A-AC25-4A314A24384D}"/>
+          </ac:picMkLst>
+        </pc:picChg>
+        <pc:cxnChg chg="mod ord">
+          <ac:chgData name="Khoa" userId="7c7bd88e-db2d-46c9-9acd-efbe43ea0329" providerId="ADAL" clId="{ABD0BB49-6322-4496-8D0D-FD49B3F95C27}" dt="2020-11-09T02:46:29.875" v="295" actId="14100"/>
+          <ac:cxnSpMkLst>
+            <pc:docMk/>
+            <pc:sldMk cId="3964914803" sldId="261"/>
+            <ac:cxnSpMk id="12" creationId="{D86309D3-EB9B-4415-9117-874D2DFB9A59}"/>
+          </ac:cxnSpMkLst>
+        </pc:cxnChg>
+      </pc:sldChg>
+    </pc:docChg>
+  </pc:docChgLst>
   <pc:docChgLst>
     <pc:chgData name="Khoa" userId="7c7bd88e-db2d-46c9-9acd-efbe43ea0329" providerId="ADAL" clId="{6F737985-BC5B-430E-BB3B-FA80EC863B84}"/>
     <pc:docChg chg="undo custSel addSld delSld modSld">
@@ -393,7 +533,7 @@
           <a:p>
             <a:fld id="{25023FED-F182-4EFB-A9F5-6916EBB45918}" type="datetimeFigureOut">
               <a:rPr lang="en-US" smtClean="0"/>
-              <a:t>11/5/2020</a:t>
+              <a:t>11/9/2020</a:t>
             </a:fld>
             <a:endParaRPr lang="en-US"/>
           </a:p>
@@ -591,7 +731,7 @@
           <a:p>
             <a:fld id="{25023FED-F182-4EFB-A9F5-6916EBB45918}" type="datetimeFigureOut">
               <a:rPr lang="en-US" smtClean="0"/>
-              <a:t>11/5/2020</a:t>
+              <a:t>11/9/2020</a:t>
             </a:fld>
             <a:endParaRPr lang="en-US"/>
           </a:p>
@@ -799,7 +939,7 @@
           <a:p>
             <a:fld id="{25023FED-F182-4EFB-A9F5-6916EBB45918}" type="datetimeFigureOut">
               <a:rPr lang="en-US" smtClean="0"/>
-              <a:t>11/5/2020</a:t>
+              <a:t>11/9/2020</a:t>
             </a:fld>
             <a:endParaRPr lang="en-US"/>
           </a:p>
@@ -997,7 +1137,7 @@
           <a:p>
             <a:fld id="{25023FED-F182-4EFB-A9F5-6916EBB45918}" type="datetimeFigureOut">
               <a:rPr lang="en-US" smtClean="0"/>
-              <a:t>11/5/2020</a:t>
+              <a:t>11/9/2020</a:t>
             </a:fld>
             <a:endParaRPr lang="en-US"/>
           </a:p>
@@ -1272,7 +1412,7 @@
           <a:p>
             <a:fld id="{25023FED-F182-4EFB-A9F5-6916EBB45918}" type="datetimeFigureOut">
               <a:rPr lang="en-US" smtClean="0"/>
-              <a:t>11/5/2020</a:t>
+              <a:t>11/9/2020</a:t>
             </a:fld>
             <a:endParaRPr lang="en-US"/>
           </a:p>
@@ -1537,7 +1677,7 @@
           <a:p>
             <a:fld id="{25023FED-F182-4EFB-A9F5-6916EBB45918}" type="datetimeFigureOut">
               <a:rPr lang="en-US" smtClean="0"/>
-              <a:t>11/5/2020</a:t>
+              <a:t>11/9/2020</a:t>
             </a:fld>
             <a:endParaRPr lang="en-US"/>
           </a:p>
@@ -1949,7 +2089,7 @@
           <a:p>
             <a:fld id="{25023FED-F182-4EFB-A9F5-6916EBB45918}" type="datetimeFigureOut">
               <a:rPr lang="en-US" smtClean="0"/>
-              <a:t>11/5/2020</a:t>
+              <a:t>11/9/2020</a:t>
             </a:fld>
             <a:endParaRPr lang="en-US"/>
           </a:p>
@@ -2090,7 +2230,7 @@
           <a:p>
             <a:fld id="{25023FED-F182-4EFB-A9F5-6916EBB45918}" type="datetimeFigureOut">
               <a:rPr lang="en-US" smtClean="0"/>
-              <a:t>11/5/2020</a:t>
+              <a:t>11/9/2020</a:t>
             </a:fld>
             <a:endParaRPr lang="en-US"/>
           </a:p>
@@ -2203,7 +2343,7 @@
           <a:p>
             <a:fld id="{25023FED-F182-4EFB-A9F5-6916EBB45918}" type="datetimeFigureOut">
               <a:rPr lang="en-US" smtClean="0"/>
-              <a:t>11/5/2020</a:t>
+              <a:t>11/9/2020</a:t>
             </a:fld>
             <a:endParaRPr lang="en-US"/>
           </a:p>
@@ -2514,7 +2654,7 @@
           <a:p>
             <a:fld id="{25023FED-F182-4EFB-A9F5-6916EBB45918}" type="datetimeFigureOut">
               <a:rPr lang="en-US" smtClean="0"/>
-              <a:t>11/5/2020</a:t>
+              <a:t>11/9/2020</a:t>
             </a:fld>
             <a:endParaRPr lang="en-US"/>
           </a:p>
@@ -2802,7 +2942,7 @@
           <a:p>
             <a:fld id="{25023FED-F182-4EFB-A9F5-6916EBB45918}" type="datetimeFigureOut">
               <a:rPr lang="en-US" smtClean="0"/>
-              <a:t>11/5/2020</a:t>
+              <a:t>11/9/2020</a:t>
             </a:fld>
             <a:endParaRPr lang="en-US"/>
           </a:p>
@@ -3043,7 +3183,7 @@
           <a:p>
             <a:fld id="{25023FED-F182-4EFB-A9F5-6916EBB45918}" type="datetimeFigureOut">
               <a:rPr lang="en-US" smtClean="0"/>
-              <a:t>11/5/2020</a:t>
+              <a:t>11/9/2020</a:t>
             </a:fld>
             <a:endParaRPr lang="en-US"/>
           </a:p>
@@ -3948,6 +4088,515 @@
 </p:sld>
 </file>
 
+<file path=ppt/slides/slide3.xml><?xml version="1.0" encoding="utf-8"?>
+<p:sld xmlns:a="http://schemas.openxmlformats.org/drawingml/2006/main" xmlns:r="http://schemas.openxmlformats.org/officeDocument/2006/relationships" xmlns:p="http://schemas.openxmlformats.org/presentationml/2006/main">
+  <p:cSld>
+    <p:spTree>
+      <p:nvGrpSpPr>
+        <p:cNvPr id="1" name=""/>
+        <p:cNvGrpSpPr/>
+        <p:nvPr/>
+      </p:nvGrpSpPr>
+      <p:grpSpPr>
+        <a:xfrm>
+          <a:off x="0" y="0"/>
+          <a:ext cx="0" cy="0"/>
+          <a:chOff x="0" y="0"/>
+          <a:chExt cx="0" cy="0"/>
+        </a:xfrm>
+      </p:grpSpPr>
+      <p:sp>
+        <p:nvSpPr>
+          <p:cNvPr id="20" name="TextBox 19">
+            <a:extLst>
+              <a:ext uri="{FF2B5EF4-FFF2-40B4-BE49-F238E27FC236}">
+                <a16:creationId xmlns:a16="http://schemas.microsoft.com/office/drawing/2014/main" id="{20298BB0-80DE-4244-80ED-0C2D627D2755}"/>
+              </a:ext>
+            </a:extLst>
+          </p:cNvPr>
+          <p:cNvSpPr txBox="1"/>
+          <p:nvPr/>
+        </p:nvSpPr>
+        <p:spPr>
+          <a:xfrm>
+            <a:off x="214009" y="233464"/>
+            <a:ext cx="6074316" cy="1015663"/>
+          </a:xfrm>
+          <a:prstGeom prst="rect">
+            <a:avLst/>
+          </a:prstGeom>
+          <a:noFill/>
+        </p:spPr>
+        <p:txBody>
+          <a:bodyPr wrap="square" rtlCol="0">
+            <a:spAutoFit/>
+          </a:bodyPr>
+          <a:lstStyle/>
+          <a:p>
+            <a:r>
+              <a:rPr lang="en-US" sz="6000" dirty="0"/>
+              <a:t>Template</a:t>
+            </a:r>
+          </a:p>
+        </p:txBody>
+      </p:sp>
+      <p:pic>
+        <p:nvPicPr>
+          <p:cNvPr id="13" name="Picture 12">
+            <a:extLst>
+              <a:ext uri="{FF2B5EF4-FFF2-40B4-BE49-F238E27FC236}">
+                <a16:creationId xmlns:a16="http://schemas.microsoft.com/office/drawing/2014/main" id="{FA2CB288-A1E5-4CEC-98C3-397333E359A0}"/>
+              </a:ext>
+            </a:extLst>
+          </p:cNvPr>
+          <p:cNvPicPr>
+            <a:picLocks noChangeAspect="1"/>
+          </p:cNvPicPr>
+          <p:nvPr/>
+        </p:nvPicPr>
+        <p:blipFill>
+          <a:blip r:embed="rId2"/>
+          <a:stretch>
+            <a:fillRect/>
+          </a:stretch>
+        </p:blipFill>
+        <p:spPr>
+          <a:xfrm>
+            <a:off x="5567495" y="2133942"/>
+            <a:ext cx="6546683" cy="792005"/>
+          </a:xfrm>
+          <a:prstGeom prst="rect">
+            <a:avLst/>
+          </a:prstGeom>
+        </p:spPr>
+      </p:pic>
+      <p:sp>
+        <p:nvSpPr>
+          <p:cNvPr id="10" name="Rectangle 9">
+            <a:extLst>
+              <a:ext uri="{FF2B5EF4-FFF2-40B4-BE49-F238E27FC236}">
+                <a16:creationId xmlns:a16="http://schemas.microsoft.com/office/drawing/2014/main" id="{09B9DE19-C65F-427B-8A54-95F3E5D893F2}"/>
+              </a:ext>
+            </a:extLst>
+          </p:cNvPr>
+          <p:cNvSpPr/>
+          <p:nvPr/>
+        </p:nvSpPr>
+        <p:spPr>
+          <a:xfrm>
+            <a:off x="29184" y="2303363"/>
+            <a:ext cx="5470218" cy="898321"/>
+          </a:xfrm>
+          <a:prstGeom prst="rect">
+            <a:avLst/>
+          </a:prstGeom>
+          <a:noFill/>
+          <a:ln w="19050">
+            <a:solidFill>
+              <a:srgbClr val="FF0000"/>
+            </a:solidFill>
+          </a:ln>
+        </p:spPr>
+        <p:style>
+          <a:lnRef idx="2">
+            <a:schemeClr val="accent1">
+              <a:shade val="50000"/>
+            </a:schemeClr>
+          </a:lnRef>
+          <a:fillRef idx="1">
+            <a:schemeClr val="accent1"/>
+          </a:fillRef>
+          <a:effectRef idx="0">
+            <a:schemeClr val="accent1"/>
+          </a:effectRef>
+          <a:fontRef idx="minor">
+            <a:schemeClr val="lt1"/>
+          </a:fontRef>
+        </p:style>
+        <p:txBody>
+          <a:bodyPr rtlCol="0" anchor="ctr"/>
+          <a:lstStyle/>
+          <a:p>
+            <a:pPr algn="ctr"/>
+            <a:r>
+              <a:rPr lang="en-US" b="1" dirty="0">
+                <a:solidFill>
+                  <a:srgbClr val="FF0000"/>
+                </a:solidFill>
+              </a:rPr>
+              <a:t>Type </a:t>
+            </a:r>
+          </a:p>
+          <a:p>
+            <a:pPr algn="ctr"/>
+            <a:r>
+              <a:rPr lang="en-US" b="1" dirty="0">
+                <a:solidFill>
+                  <a:srgbClr val="FF0000"/>
+                </a:solidFill>
+              </a:rPr>
+              <a:t>“</a:t>
+            </a:r>
+            <a:r>
+              <a:rPr lang="de-DE" b="1" dirty="0">
+                <a:solidFill>
+                  <a:srgbClr val="FF0000"/>
+                </a:solidFill>
+              </a:rPr>
+              <a:t>add /n Schwarzenegger /h 188 /w 113 /e 100 /c 2500“ into the console</a:t>
+            </a:r>
+            <a:endParaRPr lang="en-US" b="1" dirty="0">
+              <a:solidFill>
+                <a:srgbClr val="FF0000"/>
+              </a:solidFill>
+            </a:endParaRPr>
+          </a:p>
+        </p:txBody>
+      </p:sp>
+      <p:cxnSp>
+        <p:nvCxnSpPr>
+          <p:cNvPr id="12" name="Connector: Elbow 11">
+            <a:extLst>
+              <a:ext uri="{FF2B5EF4-FFF2-40B4-BE49-F238E27FC236}">
+                <a16:creationId xmlns:a16="http://schemas.microsoft.com/office/drawing/2014/main" id="{D86309D3-EB9B-4415-9117-874D2DFB9A59}"/>
+              </a:ext>
+            </a:extLst>
+          </p:cNvPr>
+          <p:cNvCxnSpPr>
+            <a:cxnSpLocks/>
+            <a:stCxn id="10" idx="3"/>
+            <a:endCxn id="9" idx="2"/>
+          </p:cNvCxnSpPr>
+          <p:nvPr/>
+        </p:nvCxnSpPr>
+        <p:spPr>
+          <a:xfrm flipV="1">
+            <a:off x="5499402" y="2601805"/>
+            <a:ext cx="4135845" cy="150719"/>
+          </a:xfrm>
+          <a:prstGeom prst="bentConnector2">
+            <a:avLst/>
+          </a:prstGeom>
+          <a:ln w="19050">
+            <a:solidFill>
+              <a:srgbClr val="FF0000"/>
+            </a:solidFill>
+            <a:tailEnd type="triangle"/>
+          </a:ln>
+        </p:spPr>
+        <p:style>
+          <a:lnRef idx="1">
+            <a:schemeClr val="accent1"/>
+          </a:lnRef>
+          <a:fillRef idx="0">
+            <a:schemeClr val="accent1"/>
+          </a:fillRef>
+          <a:effectRef idx="0">
+            <a:schemeClr val="accent1"/>
+          </a:effectRef>
+          <a:fontRef idx="minor">
+            <a:schemeClr val="tx1"/>
+          </a:fontRef>
+        </p:style>
+      </p:cxnSp>
+      <p:sp>
+        <p:nvSpPr>
+          <p:cNvPr id="9" name="Rectangle 8">
+            <a:extLst>
+              <a:ext uri="{FF2B5EF4-FFF2-40B4-BE49-F238E27FC236}">
+                <a16:creationId xmlns:a16="http://schemas.microsoft.com/office/drawing/2014/main" id="{3FE3CF31-D108-489E-861C-F6EF732C5F94}"/>
+              </a:ext>
+            </a:extLst>
+          </p:cNvPr>
+          <p:cNvSpPr/>
+          <p:nvPr/>
+        </p:nvSpPr>
+        <p:spPr>
+          <a:xfrm>
+            <a:off x="7266562" y="2133942"/>
+            <a:ext cx="4737370" cy="467863"/>
+          </a:xfrm>
+          <a:prstGeom prst="rect">
+            <a:avLst/>
+          </a:prstGeom>
+          <a:noFill/>
+          <a:ln w="19050">
+            <a:solidFill>
+              <a:srgbClr val="FF0000"/>
+            </a:solidFill>
+          </a:ln>
+        </p:spPr>
+        <p:style>
+          <a:lnRef idx="2">
+            <a:schemeClr val="accent1">
+              <a:shade val="50000"/>
+            </a:schemeClr>
+          </a:lnRef>
+          <a:fillRef idx="1">
+            <a:schemeClr val="accent1"/>
+          </a:fillRef>
+          <a:effectRef idx="0">
+            <a:schemeClr val="accent1"/>
+          </a:effectRef>
+          <a:fontRef idx="minor">
+            <a:schemeClr val="lt1"/>
+          </a:fontRef>
+        </p:style>
+        <p:txBody>
+          <a:bodyPr rtlCol="0" anchor="ctr"/>
+          <a:lstStyle/>
+          <a:p>
+            <a:pPr algn="ctr"/>
+            <a:endParaRPr lang="en-US">
+              <a:noFill/>
+            </a:endParaRPr>
+          </a:p>
+        </p:txBody>
+      </p:sp>
+    </p:spTree>
+    <p:extLst>
+      <p:ext uri="{BB962C8B-B14F-4D97-AF65-F5344CB8AC3E}">
+        <p14:creationId xmlns:p14="http://schemas.microsoft.com/office/powerpoint/2010/main" val="108612160"/>
+      </p:ext>
+    </p:extLst>
+  </p:cSld>
+  <p:clrMapOvr>
+    <a:masterClrMapping/>
+  </p:clrMapOvr>
+</p:sld>
+</file>
+
+<file path=ppt/slides/slide4.xml><?xml version="1.0" encoding="utf-8"?>
+<p:sld xmlns:a="http://schemas.openxmlformats.org/drawingml/2006/main" xmlns:r="http://schemas.openxmlformats.org/officeDocument/2006/relationships" xmlns:p="http://schemas.openxmlformats.org/presentationml/2006/main">
+  <p:cSld>
+    <p:spTree>
+      <p:nvGrpSpPr>
+        <p:cNvPr id="1" name=""/>
+        <p:cNvGrpSpPr/>
+        <p:nvPr/>
+      </p:nvGrpSpPr>
+      <p:grpSpPr>
+        <a:xfrm>
+          <a:off x="0" y="0"/>
+          <a:ext cx="0" cy="0"/>
+          <a:chOff x="0" y="0"/>
+          <a:chExt cx="0" cy="0"/>
+        </a:xfrm>
+      </p:grpSpPr>
+      <p:pic>
+        <p:nvPicPr>
+          <p:cNvPr id="4" name="Picture 3">
+            <a:extLst>
+              <a:ext uri="{FF2B5EF4-FFF2-40B4-BE49-F238E27FC236}">
+                <a16:creationId xmlns:a16="http://schemas.microsoft.com/office/drawing/2014/main" id="{EB3D3206-8BF9-470A-AC25-4A314A24384D}"/>
+              </a:ext>
+            </a:extLst>
+          </p:cNvPr>
+          <p:cNvPicPr>
+            <a:picLocks noChangeAspect="1"/>
+          </p:cNvPicPr>
+          <p:nvPr/>
+        </p:nvPicPr>
+        <p:blipFill rotWithShape="1">
+          <a:blip r:embed="rId2"/>
+          <a:srcRect r="16074" b="4756"/>
+          <a:stretch/>
+        </p:blipFill>
+        <p:spPr>
+          <a:xfrm>
+            <a:off x="4445885" y="1967673"/>
+            <a:ext cx="7535008" cy="1850434"/>
+          </a:xfrm>
+          <a:prstGeom prst="rect">
+            <a:avLst/>
+          </a:prstGeom>
+        </p:spPr>
+      </p:pic>
+      <p:sp>
+        <p:nvSpPr>
+          <p:cNvPr id="9" name="Rectangle 8">
+            <a:extLst>
+              <a:ext uri="{FF2B5EF4-FFF2-40B4-BE49-F238E27FC236}">
+                <a16:creationId xmlns:a16="http://schemas.microsoft.com/office/drawing/2014/main" id="{3FE3CF31-D108-489E-861C-F6EF732C5F94}"/>
+              </a:ext>
+            </a:extLst>
+          </p:cNvPr>
+          <p:cNvSpPr/>
+          <p:nvPr/>
+        </p:nvSpPr>
+        <p:spPr>
+          <a:xfrm>
+            <a:off x="5048654" y="2315183"/>
+            <a:ext cx="6932239" cy="1502924"/>
+          </a:xfrm>
+          <a:prstGeom prst="rect">
+            <a:avLst/>
+          </a:prstGeom>
+          <a:noFill/>
+          <a:ln w="19050">
+            <a:solidFill>
+              <a:srgbClr val="FF0000"/>
+            </a:solidFill>
+          </a:ln>
+        </p:spPr>
+        <p:style>
+          <a:lnRef idx="2">
+            <a:schemeClr val="accent1">
+              <a:shade val="50000"/>
+            </a:schemeClr>
+          </a:lnRef>
+          <a:fillRef idx="1">
+            <a:schemeClr val="accent1"/>
+          </a:fillRef>
+          <a:effectRef idx="0">
+            <a:schemeClr val="accent1"/>
+          </a:effectRef>
+          <a:fontRef idx="minor">
+            <a:schemeClr val="lt1"/>
+          </a:fontRef>
+        </p:style>
+        <p:txBody>
+          <a:bodyPr rtlCol="0" anchor="ctr"/>
+          <a:lstStyle/>
+          <a:p>
+            <a:pPr algn="ctr"/>
+            <a:endParaRPr lang="en-US">
+              <a:noFill/>
+            </a:endParaRPr>
+          </a:p>
+        </p:txBody>
+      </p:sp>
+      <p:sp>
+        <p:nvSpPr>
+          <p:cNvPr id="10" name="Rectangle 9">
+            <a:extLst>
+              <a:ext uri="{FF2B5EF4-FFF2-40B4-BE49-F238E27FC236}">
+                <a16:creationId xmlns:a16="http://schemas.microsoft.com/office/drawing/2014/main" id="{09B9DE19-C65F-427B-8A54-95F3E5D893F2}"/>
+              </a:ext>
+            </a:extLst>
+          </p:cNvPr>
+          <p:cNvSpPr/>
+          <p:nvPr/>
+        </p:nvSpPr>
+        <p:spPr>
+          <a:xfrm>
+            <a:off x="1293779" y="2811294"/>
+            <a:ext cx="2684834" cy="515566"/>
+          </a:xfrm>
+          <a:prstGeom prst="rect">
+            <a:avLst/>
+          </a:prstGeom>
+          <a:noFill/>
+          <a:ln w="19050">
+            <a:solidFill>
+              <a:srgbClr val="FF0000"/>
+            </a:solidFill>
+          </a:ln>
+        </p:spPr>
+        <p:style>
+          <a:lnRef idx="2">
+            <a:schemeClr val="accent1">
+              <a:shade val="50000"/>
+            </a:schemeClr>
+          </a:lnRef>
+          <a:fillRef idx="1">
+            <a:schemeClr val="accent1"/>
+          </a:fillRef>
+          <a:effectRef idx="0">
+            <a:schemeClr val="accent1"/>
+          </a:effectRef>
+          <a:fontRef idx="minor">
+            <a:schemeClr val="lt1"/>
+          </a:fontRef>
+        </p:style>
+        <p:txBody>
+          <a:bodyPr rtlCol="0" anchor="ctr"/>
+          <a:lstStyle/>
+          <a:p>
+            <a:pPr algn="ctr"/>
+            <a:r>
+              <a:rPr lang="en-US" b="1" dirty="0">
+                <a:solidFill>
+                  <a:srgbClr val="FF0000"/>
+                </a:solidFill>
+              </a:rPr>
+              <a:t>A confirmation message </a:t>
+            </a:r>
+          </a:p>
+          <a:p>
+            <a:pPr algn="ctr"/>
+            <a:r>
+              <a:rPr lang="en-US" b="1" dirty="0">
+                <a:solidFill>
+                  <a:srgbClr val="FF0000"/>
+                </a:solidFill>
+              </a:rPr>
+              <a:t>showing your profile</a:t>
+            </a:r>
+          </a:p>
+        </p:txBody>
+      </p:sp>
+      <p:cxnSp>
+        <p:nvCxnSpPr>
+          <p:cNvPr id="12" name="Connector: Elbow 11">
+            <a:extLst>
+              <a:ext uri="{FF2B5EF4-FFF2-40B4-BE49-F238E27FC236}">
+                <a16:creationId xmlns:a16="http://schemas.microsoft.com/office/drawing/2014/main" id="{D86309D3-EB9B-4415-9117-874D2DFB9A59}"/>
+              </a:ext>
+            </a:extLst>
+          </p:cNvPr>
+          <p:cNvCxnSpPr>
+            <a:cxnSpLocks/>
+            <a:stCxn id="10" idx="3"/>
+            <a:endCxn id="9" idx="1"/>
+          </p:cNvCxnSpPr>
+          <p:nvPr/>
+        </p:nvCxnSpPr>
+        <p:spPr>
+          <a:xfrm flipV="1">
+            <a:off x="3978613" y="3066645"/>
+            <a:ext cx="1070041" cy="2432"/>
+          </a:xfrm>
+          <a:prstGeom prst="bentConnector3">
+            <a:avLst>
+              <a:gd name="adj1" fmla="val 50000"/>
+            </a:avLst>
+          </a:prstGeom>
+          <a:ln w="19050">
+            <a:solidFill>
+              <a:srgbClr val="FF0000"/>
+            </a:solidFill>
+            <a:tailEnd type="triangle"/>
+          </a:ln>
+        </p:spPr>
+        <p:style>
+          <a:lnRef idx="1">
+            <a:schemeClr val="accent1"/>
+          </a:lnRef>
+          <a:fillRef idx="0">
+            <a:schemeClr val="accent1"/>
+          </a:fillRef>
+          <a:effectRef idx="0">
+            <a:schemeClr val="accent1"/>
+          </a:effectRef>
+          <a:fontRef idx="minor">
+            <a:schemeClr val="tx1"/>
+          </a:fontRef>
+        </p:style>
+      </p:cxnSp>
+    </p:spTree>
+    <p:extLst>
+      <p:ext uri="{BB962C8B-B14F-4D97-AF65-F5344CB8AC3E}">
+        <p14:creationId xmlns:p14="http://schemas.microsoft.com/office/powerpoint/2010/main" val="3964914803"/>
+      </p:ext>
+    </p:extLst>
+  </p:cSld>
+  <p:clrMapOvr>
+    <a:masterClrMapping/>
+  </p:clrMapOvr>
+</p:sld>
+</file>
+
 <file path=ppt/theme/theme1.xml><?xml version="1.0" encoding="utf-8"?>
 <a:theme xmlns:a="http://schemas.openxmlformats.org/drawingml/2006/main" name="Office Theme">
   <a:themeElements>

</xml_diff>